<commit_message>
docs: Add slides of the causes of hunger
</commit_message>
<xml_diff>
--- a/01_public_health_study/public_health_study_presentation.pptx
+++ b/01_public_health_study/public_health_study_presentation.pptx
@@ -7,6 +7,11 @@
   <p:sldIdLst>
     <p:sldId id="256" r:id="rId2"/>
     <p:sldId id="257" r:id="rId3"/>
+    <p:sldId id="259" r:id="rId4"/>
+    <p:sldId id="260" r:id="rId5"/>
+    <p:sldId id="261" r:id="rId6"/>
+    <p:sldId id="262" r:id="rId7"/>
+    <p:sldId id="263" r:id="rId8"/>
   </p:sldIdLst>
   <p:sldSz cx="12192000" cy="6858000"/>
   <p:notesSz cx="6858000" cy="9144000"/>
@@ -105,6 +110,11 @@
       </a:defRPr>
     </a:lvl9pPr>
   </p:defaultTextStyle>
+  <p:extLst>
+    <p:ext uri="{EFAFB233-063F-42B5-8137-9DF3F51BA10A}">
+      <p15:sldGuideLst xmlns:p15="http://schemas.microsoft.com/office/powerpoint/2012/main"/>
+    </p:ext>
+  </p:extLst>
 </p:presentation>
 </file>
 
@@ -352,7 +362,7 @@
           <a:p>
             <a:fld id="{9184DA70-C731-4C70-880D-CCD4705E623C}" type="datetime1">
               <a:rPr lang="en-US" smtClean="0"/>
-              <a:t>5/2/2020</a:t>
+              <a:t>5/5/2020</a:t>
             </a:fld>
             <a:endParaRPr lang="en-US" dirty="0"/>
           </a:p>
@@ -540,7 +550,7 @@
           <a:p>
             <a:fld id="{B612A279-0833-481D-8C56-F67FD0AC6C50}" type="datetime1">
               <a:rPr lang="en-US" smtClean="0"/>
-              <a:t>5/2/2020</a:t>
+              <a:t>5/5/2020</a:t>
             </a:fld>
             <a:endParaRPr lang="en-US" dirty="0"/>
           </a:p>
@@ -782,7 +792,7 @@
           <a:p>
             <a:fld id="{6587DA83-5663-4C9C-B9AA-0B40A3DAFF81}" type="datetime1">
               <a:rPr lang="en-US" smtClean="0"/>
-              <a:t>5/2/2020</a:t>
+              <a:t>5/5/2020</a:t>
             </a:fld>
             <a:endParaRPr lang="en-US" dirty="0"/>
           </a:p>
@@ -970,7 +980,7 @@
           <a:p>
             <a:fld id="{4BE1D723-8F53-4F53-90B0-1982A396982E}" type="datetime1">
               <a:rPr lang="en-US" smtClean="0"/>
-              <a:t>5/2/2020</a:t>
+              <a:t>5/5/2020</a:t>
             </a:fld>
             <a:endParaRPr lang="en-US" dirty="0"/>
           </a:p>
@@ -1343,7 +1353,7 @@
           <a:p>
             <a:fld id="{97669AF7-7BEB-44E4-9852-375E34362B5B}" type="datetime1">
               <a:rPr lang="en-US" smtClean="0"/>
-              <a:t>5/2/2020</a:t>
+              <a:t>5/5/2020</a:t>
             </a:fld>
             <a:endParaRPr lang="en-US" dirty="0"/>
           </a:p>
@@ -1598,7 +1608,7 @@
           <a:p>
             <a:fld id="{BAAAC38D-0552-4C82-B593-E6124DFADBE2}" type="datetime1">
               <a:rPr lang="en-US" smtClean="0"/>
-              <a:t>5/2/2020</a:t>
+              <a:t>5/5/2020</a:t>
             </a:fld>
             <a:endParaRPr lang="en-US" dirty="0"/>
           </a:p>
@@ -1995,7 +2005,7 @@
           <a:p>
             <a:fld id="{D9DF0F1C-5577-4ACB-BB62-DF8F3C494C7E}" type="datetime1">
               <a:rPr lang="en-US" smtClean="0"/>
-              <a:t>5/2/2020</a:t>
+              <a:t>5/5/2020</a:t>
             </a:fld>
             <a:endParaRPr lang="en-US" dirty="0"/>
           </a:p>
@@ -2131,7 +2141,7 @@
           <a:p>
             <a:fld id="{1775B394-D9F9-4F0C-B15D-605F45CB9E9F}" type="datetime1">
               <a:rPr lang="en-US" smtClean="0"/>
-              <a:t>5/2/2020</a:t>
+              <a:t>5/5/2020</a:t>
             </a:fld>
             <a:endParaRPr lang="en-US" dirty="0"/>
           </a:p>
@@ -2288,7 +2298,7 @@
           <a:p>
             <a:fld id="{39667345-2558-425A-8533-9BFDBCE15005}" type="datetime1">
               <a:rPr lang="en-US" smtClean="0"/>
-              <a:t>5/2/2020</a:t>
+              <a:t>5/5/2020</a:t>
             </a:fld>
             <a:endParaRPr lang="en-US" dirty="0"/>
           </a:p>
@@ -2617,7 +2627,7 @@
           <a:p>
             <a:fld id="{92BEA474-078D-4E9B-9B14-09A87B19DC46}" type="datetime1">
               <a:rPr lang="en-US" smtClean="0"/>
-              <a:t>5/2/2020</a:t>
+              <a:t>5/5/2020</a:t>
             </a:fld>
             <a:endParaRPr lang="en-US" dirty="0"/>
           </a:p>
@@ -2967,7 +2977,7 @@
           <a:p>
             <a:fld id="{4907D986-8816-4272-A432-0437A28A9828}" type="datetime1">
               <a:rPr lang="en-US" smtClean="0"/>
-              <a:t>5/2/2020</a:t>
+              <a:t>5/5/2020</a:t>
             </a:fld>
             <a:endParaRPr lang="en-US" dirty="0"/>
           </a:p>
@@ -3228,7 +3238,7 @@
           <a:p>
             <a:fld id="{62D6E202-B606-4609-B914-27C9371A1F6D}" type="datetime1">
               <a:rPr lang="en-US" smtClean="0"/>
-              <a:t>5/2/2020</a:t>
+              <a:t>5/5/2020</a:t>
             </a:fld>
             <a:endParaRPr lang="en-US" dirty="0"/>
           </a:p>
@@ -3881,15 +3891,31 @@
           </a:bodyPr>
           <a:lstStyle/>
           <a:p>
-            <a:r>
-              <a:rPr lang="en-US">
+            <a:pPr algn="ctr"/>
+            <a:r>
+              <a:rPr lang="en-US" sz="6000" b="1" dirty="0">
                 <a:solidFill>
                   <a:srgbClr val="FFFFFF"/>
                 </a:solidFill>
               </a:rPr>
-              <a:t>Public Health Study</a:t>
-            </a:r>
-            <a:endParaRPr lang="it-IT">
+              <a:t>GLOBAL UNDERNUTRITION </a:t>
+            </a:r>
+            <a:br>
+              <a:rPr lang="en-US" sz="6000" dirty="0">
+                <a:solidFill>
+                  <a:srgbClr val="FFFFFF"/>
+                </a:solidFill>
+              </a:rPr>
+            </a:br>
+            <a:r>
+              <a:rPr lang="en-US" sz="5400" dirty="0">
+                <a:solidFill>
+                  <a:srgbClr val="FFFFFF"/>
+                </a:solidFill>
+              </a:rPr>
+              <a:t>1 IN 9 PEOPLE AROUND THE WORLD GO HUNGRY EACH DAY</a:t>
+            </a:r>
+            <a:endParaRPr lang="it-IT" sz="5400" dirty="0">
               <a:solidFill>
                 <a:srgbClr val="FFFFFF"/>
               </a:solidFill>
@@ -3926,14 +3952,32 @@
           <a:lstStyle/>
           <a:p>
             <a:r>
-              <a:rPr lang="en-US">
+              <a:rPr lang="en-US" dirty="0">
                 <a:solidFill>
                   <a:srgbClr val="FFFFFF"/>
                 </a:solidFill>
               </a:rPr>
-              <a:t>WORLD HUNGER</a:t>
-            </a:r>
-            <a:endParaRPr lang="it-IT">
+              <a:t>Public health study(</a:t>
+            </a:r>
+            <a:r>
+              <a:rPr lang="en-US" dirty="0" err="1">
+                <a:solidFill>
+                  <a:srgbClr val="FFFFFF"/>
+                </a:solidFill>
+              </a:rPr>
+              <a:t>fao</a:t>
+            </a:r>
+            <a:r>
+              <a:rPr lang="en-US" dirty="0">
+                <a:solidFill>
+                  <a:srgbClr val="FFFFFF"/>
+                </a:solidFill>
+              </a:rPr>
+              <a:t>*)</a:t>
+            </a:r>
+          </a:p>
+          <a:p>
+            <a:endParaRPr lang="en-US" dirty="0">
               <a:solidFill>
                 <a:srgbClr val="FFFFFF"/>
               </a:solidFill>
@@ -4049,6 +4093,53 @@
             <a:schemeClr val="lt1"/>
           </a:fontRef>
         </p:style>
+      </p:sp>
+      <p:sp>
+        <p:nvSpPr>
+          <p:cNvPr id="5" name="TextBox 4">
+            <a:extLst>
+              <a:ext uri="{FF2B5EF4-FFF2-40B4-BE49-F238E27FC236}">
+                <a16:creationId xmlns:a16="http://schemas.microsoft.com/office/drawing/2014/main" id="{B1F48905-D80F-411B-B480-4D40C1FE2702}"/>
+              </a:ext>
+            </a:extLst>
+          </p:cNvPr>
+          <p:cNvSpPr txBox="1"/>
+          <p:nvPr/>
+        </p:nvSpPr>
+        <p:spPr>
+          <a:xfrm>
+            <a:off x="93306" y="6444734"/>
+            <a:ext cx="10142376" cy="646331"/>
+          </a:xfrm>
+          <a:prstGeom prst="rect">
+            <a:avLst/>
+          </a:prstGeom>
+          <a:noFill/>
+        </p:spPr>
+        <p:txBody>
+          <a:bodyPr wrap="square" rtlCol="0">
+            <a:spAutoFit/>
+          </a:bodyPr>
+          <a:lstStyle/>
+          <a:p>
+            <a:r>
+              <a:rPr lang="en-US" dirty="0">
+                <a:solidFill>
+                  <a:srgbClr val="FFFFFF"/>
+                </a:solidFill>
+              </a:rPr>
+              <a:t>(*)Food and agriculture organization of the united nations</a:t>
+            </a:r>
+            <a:endParaRPr lang="it-IT" dirty="0">
+              <a:solidFill>
+                <a:srgbClr val="FFFFFF"/>
+              </a:solidFill>
+            </a:endParaRPr>
+          </a:p>
+          <a:p>
+            <a:endParaRPr lang="it-IT" dirty="0"/>
+          </a:p>
+        </p:txBody>
       </p:sp>
     </p:spTree>
     <p:extLst>
@@ -4066,6 +4157,14 @@
 <file path=ppt/slides/slide2.xml><?xml version="1.0" encoding="utf-8"?>
 <p:sld xmlns:a="http://schemas.openxmlformats.org/drawingml/2006/main" xmlns:r="http://schemas.openxmlformats.org/officeDocument/2006/relationships" xmlns:p="http://schemas.openxmlformats.org/presentationml/2006/main">
   <p:cSld>
+    <p:bg>
+      <p:bgPr>
+        <a:solidFill>
+          <a:schemeClr val="bg1"/>
+        </a:solidFill>
+        <a:effectLst/>
+      </p:bgPr>
+    </p:bg>
     <p:spTree>
       <p:nvGrpSpPr>
         <p:cNvPr id="1" name=""/>
@@ -4082,6 +4181,208 @@
       </p:grpSpPr>
       <p:sp>
         <p:nvSpPr>
+          <p:cNvPr id="41" name="Rectangle 30">
+            <a:extLst>
+              <a:ext uri="{FF2B5EF4-FFF2-40B4-BE49-F238E27FC236}">
+                <a16:creationId xmlns:a16="http://schemas.microsoft.com/office/drawing/2014/main" id="{39E3965E-AC41-4711-9D10-E25ABB132D86}"/>
+              </a:ext>
+              <a:ext uri="{C183D7F6-B498-43B3-948B-1728B52AA6E4}">
+                <adec:decorative xmlns:adec="http://schemas.microsoft.com/office/drawing/2017/decorative" val="1"/>
+              </a:ext>
+            </a:extLst>
+          </p:cNvPr>
+          <p:cNvSpPr>
+            <a:spLocks noGrp="1" noRot="1" noChangeAspect="1" noMove="1" noResize="1" noEditPoints="1" noAdjustHandles="1" noChangeArrowheads="1" noChangeShapeType="1" noTextEdit="1"/>
+          </p:cNvSpPr>
+          <p:nvPr>
+            <p:extLst>
+              <p:ext uri="{386F3935-93C4-4BCD-93E2-E3B085C9AB24}">
+                <p16:designElem xmlns:p16="http://schemas.microsoft.com/office/powerpoint/2015/main" val="1"/>
+              </p:ext>
+            </p:extLst>
+          </p:nvPr>
+        </p:nvSpPr>
+        <p:spPr>
+          <a:xfrm>
+            <a:off x="3175" y="6400800"/>
+            <a:ext cx="12188825" cy="457200"/>
+          </a:xfrm>
+          <a:prstGeom prst="rect">
+            <a:avLst/>
+          </a:prstGeom>
+          <a:solidFill>
+            <a:srgbClr val="262626"/>
+          </a:solidFill>
+          <a:ln>
+            <a:noFill/>
+          </a:ln>
+        </p:spPr>
+        <p:style>
+          <a:lnRef idx="2">
+            <a:schemeClr val="accent1">
+              <a:shade val="50000"/>
+            </a:schemeClr>
+          </a:lnRef>
+          <a:fillRef idx="1">
+            <a:schemeClr val="accent1"/>
+          </a:fillRef>
+          <a:effectRef idx="0">
+            <a:schemeClr val="accent1"/>
+          </a:effectRef>
+          <a:fontRef idx="minor">
+            <a:schemeClr val="lt1"/>
+          </a:fontRef>
+        </p:style>
+      </p:sp>
+      <p:cxnSp>
+        <p:nvCxnSpPr>
+          <p:cNvPr id="42" name="Straight Connector 32">
+            <a:extLst>
+              <a:ext uri="{FF2B5EF4-FFF2-40B4-BE49-F238E27FC236}">
+                <a16:creationId xmlns:a16="http://schemas.microsoft.com/office/drawing/2014/main" id="{1F5DC8C3-BA5F-4EED-BB9A-A14272BD82A1}"/>
+              </a:ext>
+              <a:ext uri="{C183D7F6-B498-43B3-948B-1728B52AA6E4}">
+                <adec:decorative xmlns:adec="http://schemas.microsoft.com/office/drawing/2017/decorative" val="1"/>
+              </a:ext>
+            </a:extLst>
+          </p:cNvPr>
+          <p:cNvCxnSpPr>
+            <a:cxnSpLocks noGrp="1" noRot="1" noChangeAspect="1" noMove="1" noResize="1" noEditPoints="1" noAdjustHandles="1" noChangeArrowheads="1" noChangeShapeType="1"/>
+          </p:cNvCxnSpPr>
+          <p:nvPr>
+            <p:extLst>
+              <p:ext uri="{386F3935-93C4-4BCD-93E2-E3B085C9AB24}">
+                <p16:designElem xmlns:p16="http://schemas.microsoft.com/office/powerpoint/2015/main" val="1"/>
+              </p:ext>
+            </p:extLst>
+          </p:nvPr>
+        </p:nvCxnSpPr>
+        <p:spPr>
+          <a:xfrm>
+            <a:off x="1207658" y="4474741"/>
+            <a:ext cx="9875520" cy="0"/>
+          </a:xfrm>
+          <a:prstGeom prst="line">
+            <a:avLst/>
+          </a:prstGeom>
+          <a:ln w="12700">
+            <a:solidFill>
+              <a:schemeClr val="tx1">
+                <a:lumMod val="75000"/>
+                <a:lumOff val="25000"/>
+              </a:schemeClr>
+            </a:solidFill>
+          </a:ln>
+        </p:spPr>
+        <p:style>
+          <a:lnRef idx="1">
+            <a:schemeClr val="accent1"/>
+          </a:lnRef>
+          <a:fillRef idx="0">
+            <a:schemeClr val="accent1"/>
+          </a:fillRef>
+          <a:effectRef idx="0">
+            <a:schemeClr val="accent1"/>
+          </a:effectRef>
+          <a:fontRef idx="minor">
+            <a:schemeClr val="tx1"/>
+          </a:fontRef>
+        </p:style>
+      </p:cxnSp>
+      <p:pic>
+        <p:nvPicPr>
+          <p:cNvPr id="5" name="Content Placeholder 4" descr="A picture containing person, eating, sitting, young&#10;&#10;Description automatically generated">
+            <a:extLst>
+              <a:ext uri="{FF2B5EF4-FFF2-40B4-BE49-F238E27FC236}">
+                <a16:creationId xmlns:a16="http://schemas.microsoft.com/office/drawing/2014/main" id="{23969E33-09F7-4D36-A276-D65F73D63EC6}"/>
+              </a:ext>
+            </a:extLst>
+          </p:cNvPr>
+          <p:cNvPicPr>
+            <a:picLocks noGrp="1" noChangeAspect="1"/>
+          </p:cNvPicPr>
+          <p:nvPr>
+            <p:ph idx="1"/>
+          </p:nvPr>
+        </p:nvPicPr>
+        <p:blipFill rotWithShape="1">
+          <a:blip r:embed="rId2">
+            <a:extLst>
+              <a:ext uri="{28A0092B-C50C-407E-A947-70E740481C1C}">
+                <a14:useLocalDpi xmlns:a14="http://schemas.microsoft.com/office/drawing/2010/main" val="0"/>
+              </a:ext>
+            </a:extLst>
+          </a:blip>
+          <a:srcRect t="5068" b="31446"/>
+          <a:stretch/>
+        </p:blipFill>
+        <p:spPr>
+          <a:xfrm>
+            <a:off x="-32" y="10"/>
+            <a:ext cx="12192031" cy="4915066"/>
+          </a:xfrm>
+          <a:prstGeom prst="rect">
+            <a:avLst/>
+          </a:prstGeom>
+        </p:spPr>
+      </p:pic>
+      <p:sp>
+        <p:nvSpPr>
+          <p:cNvPr id="43" name="Rectangle 34">
+            <a:extLst>
+              <a:ext uri="{FF2B5EF4-FFF2-40B4-BE49-F238E27FC236}">
+                <a16:creationId xmlns:a16="http://schemas.microsoft.com/office/drawing/2014/main" id="{0B4FB531-34DA-4777-9BD5-5B885DC38198}"/>
+              </a:ext>
+              <a:ext uri="{C183D7F6-B498-43B3-948B-1728B52AA6E4}">
+                <adec:decorative xmlns:adec="http://schemas.microsoft.com/office/drawing/2017/decorative" val="1"/>
+              </a:ext>
+            </a:extLst>
+          </p:cNvPr>
+          <p:cNvSpPr>
+            <a:spLocks noGrp="1" noRot="1" noChangeAspect="1" noMove="1" noResize="1" noEditPoints="1" noAdjustHandles="1" noChangeArrowheads="1" noChangeShapeType="1" noTextEdit="1"/>
+          </p:cNvSpPr>
+          <p:nvPr>
+            <p:extLst>
+              <p:ext uri="{386F3935-93C4-4BCD-93E2-E3B085C9AB24}">
+                <p16:designElem xmlns:p16="http://schemas.microsoft.com/office/powerpoint/2015/main" val="1"/>
+              </p:ext>
+            </p:extLst>
+          </p:nvPr>
+        </p:nvSpPr>
+        <p:spPr bwMode="white">
+          <a:xfrm>
+            <a:off x="1507" y="4915076"/>
+            <a:ext cx="12188952" cy="1942924"/>
+          </a:xfrm>
+          <a:prstGeom prst="rect">
+            <a:avLst/>
+          </a:prstGeom>
+          <a:solidFill>
+            <a:srgbClr val="262626"/>
+          </a:solidFill>
+          <a:ln>
+            <a:noFill/>
+          </a:ln>
+        </p:spPr>
+        <p:style>
+          <a:lnRef idx="2">
+            <a:schemeClr val="accent1">
+              <a:shade val="50000"/>
+            </a:schemeClr>
+          </a:lnRef>
+          <a:fillRef idx="1">
+            <a:schemeClr val="accent1"/>
+          </a:fillRef>
+          <a:effectRef idx="0">
+            <a:schemeClr val="accent1"/>
+          </a:effectRef>
+          <a:fontRef idx="minor">
+            <a:schemeClr val="lt1"/>
+          </a:fontRef>
+        </p:style>
+      </p:sp>
+      <p:sp>
+        <p:nvSpPr>
           <p:cNvPr id="2" name="Title 1">
             <a:extLst>
               <a:ext uri="{FF2B5EF4-FFF2-40B4-BE49-F238E27FC236}">
@@ -4096,44 +4397,82 @@
             <p:ph type="title"/>
           </p:nvPr>
         </p:nvSpPr>
-        <p:spPr/>
-        <p:txBody>
-          <a:bodyPr/>
-          <a:lstStyle/>
-          <a:p>
-            <a:r>
-              <a:rPr lang="en-US" dirty="0"/>
-              <a:t>Introduction to the world hunger problem and FAO DATASET	</a:t>
-            </a:r>
-            <a:endParaRPr lang="it-IT" dirty="0"/>
-          </a:p>
-        </p:txBody>
-      </p:sp>
-      <p:sp>
-        <p:nvSpPr>
-          <p:cNvPr id="3" name="Content Placeholder 2">
-            <a:extLst>
-              <a:ext uri="{FF2B5EF4-FFF2-40B4-BE49-F238E27FC236}">
-                <a16:creationId xmlns:a16="http://schemas.microsoft.com/office/drawing/2014/main" id="{F7243A90-ACD1-4B68-852F-88CFC54AC5A8}"/>
-              </a:ext>
-            </a:extLst>
-          </p:cNvPr>
-          <p:cNvSpPr>
-            <a:spLocks noGrp="1"/>
-          </p:cNvSpPr>
-          <p:nvPr>
-            <p:ph idx="1"/>
-          </p:nvPr>
-        </p:nvSpPr>
-        <p:spPr/>
-        <p:txBody>
-          <a:bodyPr/>
-          <a:lstStyle/>
-          <a:p>
-            <a:endParaRPr lang="it-IT" dirty="0"/>
-          </a:p>
-        </p:txBody>
-      </p:sp>
+        <p:spPr>
+          <a:xfrm>
+            <a:off x="828675" y="5120639"/>
+            <a:ext cx="7137263" cy="1280161"/>
+          </a:xfrm>
+        </p:spPr>
+        <p:txBody>
+          <a:bodyPr vert="horz" lIns="91440" tIns="45720" rIns="91440" bIns="45720" rtlCol="0" anchor="ctr">
+            <a:normAutofit/>
+          </a:bodyPr>
+          <a:lstStyle/>
+          <a:p>
+            <a:pPr algn="ctr"/>
+            <a:r>
+              <a:rPr lang="en-US" sz="4100" dirty="0">
+                <a:solidFill>
+                  <a:srgbClr val="FFFFFF"/>
+                </a:solidFill>
+              </a:rPr>
+              <a:t>A Child Dies From Hunger Every 10 Seconds</a:t>
+            </a:r>
+          </a:p>
+        </p:txBody>
+      </p:sp>
+      <p:cxnSp>
+        <p:nvCxnSpPr>
+          <p:cNvPr id="44" name="Straight Connector 36">
+            <a:extLst>
+              <a:ext uri="{FF2B5EF4-FFF2-40B4-BE49-F238E27FC236}">
+                <a16:creationId xmlns:a16="http://schemas.microsoft.com/office/drawing/2014/main" id="{D5B557D3-D7B4-404B-84A1-9BD182BE5B06}"/>
+              </a:ext>
+              <a:ext uri="{C183D7F6-B498-43B3-948B-1728B52AA6E4}">
+                <adec:decorative xmlns:adec="http://schemas.microsoft.com/office/drawing/2017/decorative" val="1"/>
+              </a:ext>
+            </a:extLst>
+          </p:cNvPr>
+          <p:cNvCxnSpPr>
+            <a:cxnSpLocks noGrp="1" noRot="1" noChangeAspect="1" noMove="1" noResize="1" noEditPoints="1" noAdjustHandles="1" noChangeArrowheads="1" noChangeShapeType="1"/>
+          </p:cNvCxnSpPr>
+          <p:nvPr>
+            <p:extLst>
+              <p:ext uri="{386F3935-93C4-4BCD-93E2-E3B085C9AB24}">
+                <p16:designElem xmlns:p16="http://schemas.microsoft.com/office/powerpoint/2015/main" val="1"/>
+              </p:ext>
+            </p:extLst>
+          </p:nvPr>
+        </p:nvCxnSpPr>
+        <p:spPr>
+          <a:xfrm rot="16200000">
+            <a:off x="7532813" y="5760720"/>
+            <a:ext cx="1188720" cy="0"/>
+          </a:xfrm>
+          <a:prstGeom prst="line">
+            <a:avLst/>
+          </a:prstGeom>
+          <a:ln w="19050">
+            <a:solidFill>
+              <a:schemeClr val="accent1"/>
+            </a:solidFill>
+          </a:ln>
+        </p:spPr>
+        <p:style>
+          <a:lnRef idx="1">
+            <a:schemeClr val="accent1"/>
+          </a:lnRef>
+          <a:fillRef idx="0">
+            <a:schemeClr val="accent1"/>
+          </a:fillRef>
+          <a:effectRef idx="0">
+            <a:schemeClr val="accent1"/>
+          </a:effectRef>
+          <a:fontRef idx="minor">
+            <a:schemeClr val="tx1"/>
+          </a:fontRef>
+        </p:style>
+      </p:cxnSp>
     </p:spTree>
     <p:extLst>
       <p:ext uri="{BB962C8B-B14F-4D97-AF65-F5344CB8AC3E}">
@@ -4142,7 +4481,1654 @@
     </p:extLst>
   </p:cSld>
   <p:clrMapOvr>
+    <a:overrideClrMapping bg1="dk1" tx1="lt1" bg2="dk2" tx2="lt2" accent1="accent1" accent2="accent2" accent3="accent3" accent4="accent4" accent5="accent5" accent6="accent6" hlink="hlink" folHlink="folHlink"/>
+  </p:clrMapOvr>
+</p:sld>
+</file>
+
+<file path=ppt/slides/slide3.xml><?xml version="1.0" encoding="utf-8"?>
+<p:sld xmlns:a="http://schemas.openxmlformats.org/drawingml/2006/main" xmlns:r="http://schemas.openxmlformats.org/officeDocument/2006/relationships" xmlns:p="http://schemas.openxmlformats.org/presentationml/2006/main">
+  <p:cSld>
+    <p:bg>
+      <p:bgPr>
+        <a:solidFill>
+          <a:schemeClr val="bg1"/>
+        </a:solidFill>
+        <a:effectLst/>
+      </p:bgPr>
+    </p:bg>
+    <p:spTree>
+      <p:nvGrpSpPr>
+        <p:cNvPr id="1" name=""/>
+        <p:cNvGrpSpPr/>
+        <p:nvPr/>
+      </p:nvGrpSpPr>
+      <p:grpSpPr>
+        <a:xfrm>
+          <a:off x="0" y="0"/>
+          <a:ext cx="0" cy="0"/>
+          <a:chOff x="0" y="0"/>
+          <a:chExt cx="0" cy="0"/>
+        </a:xfrm>
+      </p:grpSpPr>
+      <p:sp>
+        <p:nvSpPr>
+          <p:cNvPr id="41" name="Rectangle 30">
+            <a:extLst>
+              <a:ext uri="{FF2B5EF4-FFF2-40B4-BE49-F238E27FC236}">
+                <a16:creationId xmlns:a16="http://schemas.microsoft.com/office/drawing/2014/main" id="{39E3965E-AC41-4711-9D10-E25ABB132D86}"/>
+              </a:ext>
+              <a:ext uri="{C183D7F6-B498-43B3-948B-1728B52AA6E4}">
+                <adec:decorative xmlns:adec="http://schemas.microsoft.com/office/drawing/2017/decorative" val="1"/>
+              </a:ext>
+            </a:extLst>
+          </p:cNvPr>
+          <p:cNvSpPr>
+            <a:spLocks noGrp="1" noRot="1" noChangeAspect="1" noMove="1" noResize="1" noEditPoints="1" noAdjustHandles="1" noChangeArrowheads="1" noChangeShapeType="1" noTextEdit="1"/>
+          </p:cNvSpPr>
+          <p:nvPr>
+            <p:extLst>
+              <p:ext uri="{386F3935-93C4-4BCD-93E2-E3B085C9AB24}">
+                <p16:designElem xmlns:p16="http://schemas.microsoft.com/office/powerpoint/2015/main" val="1"/>
+              </p:ext>
+            </p:extLst>
+          </p:nvPr>
+        </p:nvSpPr>
+        <p:spPr>
+          <a:xfrm>
+            <a:off x="3175" y="6400800"/>
+            <a:ext cx="12188825" cy="457200"/>
+          </a:xfrm>
+          <a:prstGeom prst="rect">
+            <a:avLst/>
+          </a:prstGeom>
+          <a:solidFill>
+            <a:srgbClr val="262626"/>
+          </a:solidFill>
+          <a:ln>
+            <a:noFill/>
+          </a:ln>
+        </p:spPr>
+        <p:style>
+          <a:lnRef idx="2">
+            <a:schemeClr val="accent1">
+              <a:shade val="50000"/>
+            </a:schemeClr>
+          </a:lnRef>
+          <a:fillRef idx="1">
+            <a:schemeClr val="accent1"/>
+          </a:fillRef>
+          <a:effectRef idx="0">
+            <a:schemeClr val="accent1"/>
+          </a:effectRef>
+          <a:fontRef idx="minor">
+            <a:schemeClr val="lt1"/>
+          </a:fontRef>
+        </p:style>
+      </p:sp>
+      <p:cxnSp>
+        <p:nvCxnSpPr>
+          <p:cNvPr id="42" name="Straight Connector 32">
+            <a:extLst>
+              <a:ext uri="{FF2B5EF4-FFF2-40B4-BE49-F238E27FC236}">
+                <a16:creationId xmlns:a16="http://schemas.microsoft.com/office/drawing/2014/main" id="{1F5DC8C3-BA5F-4EED-BB9A-A14272BD82A1}"/>
+              </a:ext>
+              <a:ext uri="{C183D7F6-B498-43B3-948B-1728B52AA6E4}">
+                <adec:decorative xmlns:adec="http://schemas.microsoft.com/office/drawing/2017/decorative" val="1"/>
+              </a:ext>
+            </a:extLst>
+          </p:cNvPr>
+          <p:cNvCxnSpPr>
+            <a:cxnSpLocks noGrp="1" noRot="1" noChangeAspect="1" noMove="1" noResize="1" noEditPoints="1" noAdjustHandles="1" noChangeArrowheads="1" noChangeShapeType="1"/>
+          </p:cNvCxnSpPr>
+          <p:nvPr>
+            <p:extLst>
+              <p:ext uri="{386F3935-93C4-4BCD-93E2-E3B085C9AB24}">
+                <p16:designElem xmlns:p16="http://schemas.microsoft.com/office/powerpoint/2015/main" val="1"/>
+              </p:ext>
+            </p:extLst>
+          </p:nvPr>
+        </p:nvCxnSpPr>
+        <p:spPr>
+          <a:xfrm>
+            <a:off x="1207658" y="4474741"/>
+            <a:ext cx="9875520" cy="0"/>
+          </a:xfrm>
+          <a:prstGeom prst="line">
+            <a:avLst/>
+          </a:prstGeom>
+          <a:ln w="12700">
+            <a:solidFill>
+              <a:schemeClr val="tx1">
+                <a:lumMod val="75000"/>
+                <a:lumOff val="25000"/>
+              </a:schemeClr>
+            </a:solidFill>
+          </a:ln>
+        </p:spPr>
+        <p:style>
+          <a:lnRef idx="1">
+            <a:schemeClr val="accent1"/>
+          </a:lnRef>
+          <a:fillRef idx="0">
+            <a:schemeClr val="accent1"/>
+          </a:fillRef>
+          <a:effectRef idx="0">
+            <a:schemeClr val="accent1"/>
+          </a:effectRef>
+          <a:fontRef idx="minor">
+            <a:schemeClr val="tx1"/>
+          </a:fontRef>
+        </p:style>
+      </p:cxnSp>
+      <p:sp>
+        <p:nvSpPr>
+          <p:cNvPr id="43" name="Rectangle 34">
+            <a:extLst>
+              <a:ext uri="{FF2B5EF4-FFF2-40B4-BE49-F238E27FC236}">
+                <a16:creationId xmlns:a16="http://schemas.microsoft.com/office/drawing/2014/main" id="{0B4FB531-34DA-4777-9BD5-5B885DC38198}"/>
+              </a:ext>
+              <a:ext uri="{C183D7F6-B498-43B3-948B-1728B52AA6E4}">
+                <adec:decorative xmlns:adec="http://schemas.microsoft.com/office/drawing/2017/decorative" val="1"/>
+              </a:ext>
+            </a:extLst>
+          </p:cNvPr>
+          <p:cNvSpPr>
+            <a:spLocks noGrp="1" noRot="1" noChangeAspect="1" noMove="1" noResize="1" noEditPoints="1" noAdjustHandles="1" noChangeArrowheads="1" noChangeShapeType="1" noTextEdit="1"/>
+          </p:cNvSpPr>
+          <p:nvPr>
+            <p:extLst>
+              <p:ext uri="{386F3935-93C4-4BCD-93E2-E3B085C9AB24}">
+                <p16:designElem xmlns:p16="http://schemas.microsoft.com/office/powerpoint/2015/main" val="1"/>
+              </p:ext>
+            </p:extLst>
+          </p:nvPr>
+        </p:nvSpPr>
+        <p:spPr bwMode="white">
+          <a:xfrm>
+            <a:off x="1507" y="4915076"/>
+            <a:ext cx="12188952" cy="1942924"/>
+          </a:xfrm>
+          <a:prstGeom prst="rect">
+            <a:avLst/>
+          </a:prstGeom>
+          <a:solidFill>
+            <a:srgbClr val="262626"/>
+          </a:solidFill>
+          <a:ln>
+            <a:noFill/>
+          </a:ln>
+        </p:spPr>
+        <p:style>
+          <a:lnRef idx="2">
+            <a:schemeClr val="accent1">
+              <a:shade val="50000"/>
+            </a:schemeClr>
+          </a:lnRef>
+          <a:fillRef idx="1">
+            <a:schemeClr val="accent1"/>
+          </a:fillRef>
+          <a:effectRef idx="0">
+            <a:schemeClr val="accent1"/>
+          </a:effectRef>
+          <a:fontRef idx="minor">
+            <a:schemeClr val="lt1"/>
+          </a:fontRef>
+        </p:style>
+      </p:sp>
+      <p:sp>
+        <p:nvSpPr>
+          <p:cNvPr id="2" name="Title 1">
+            <a:extLst>
+              <a:ext uri="{FF2B5EF4-FFF2-40B4-BE49-F238E27FC236}">
+                <a16:creationId xmlns:a16="http://schemas.microsoft.com/office/drawing/2014/main" id="{6711F5FE-D1C2-4264-AB43-B952A55FF8F2}"/>
+              </a:ext>
+            </a:extLst>
+          </p:cNvPr>
+          <p:cNvSpPr>
+            <a:spLocks noGrp="1"/>
+          </p:cNvSpPr>
+          <p:nvPr>
+            <p:ph type="title"/>
+          </p:nvPr>
+        </p:nvSpPr>
+        <p:spPr>
+          <a:xfrm>
+            <a:off x="828675" y="5120639"/>
+            <a:ext cx="7137263" cy="1280161"/>
+          </a:xfrm>
+        </p:spPr>
+        <p:txBody>
+          <a:bodyPr vert="horz" lIns="91440" tIns="45720" rIns="91440" bIns="45720" rtlCol="0" anchor="ctr">
+            <a:normAutofit/>
+          </a:bodyPr>
+          <a:lstStyle/>
+          <a:p>
+            <a:pPr algn="ctr"/>
+            <a:r>
+              <a:rPr lang="en-US" sz="4100" dirty="0">
+                <a:solidFill>
+                  <a:srgbClr val="FFFFFF"/>
+                </a:solidFill>
+              </a:rPr>
+              <a:t>The Number Of  Chronic Undernutrition is Increasing </a:t>
+            </a:r>
+          </a:p>
+        </p:txBody>
+      </p:sp>
+      <p:cxnSp>
+        <p:nvCxnSpPr>
+          <p:cNvPr id="44" name="Straight Connector 36">
+            <a:extLst>
+              <a:ext uri="{FF2B5EF4-FFF2-40B4-BE49-F238E27FC236}">
+                <a16:creationId xmlns:a16="http://schemas.microsoft.com/office/drawing/2014/main" id="{D5B557D3-D7B4-404B-84A1-9BD182BE5B06}"/>
+              </a:ext>
+              <a:ext uri="{C183D7F6-B498-43B3-948B-1728B52AA6E4}">
+                <adec:decorative xmlns:adec="http://schemas.microsoft.com/office/drawing/2017/decorative" val="1"/>
+              </a:ext>
+            </a:extLst>
+          </p:cNvPr>
+          <p:cNvCxnSpPr>
+            <a:cxnSpLocks noGrp="1" noRot="1" noChangeAspect="1" noMove="1" noResize="1" noEditPoints="1" noAdjustHandles="1" noChangeArrowheads="1" noChangeShapeType="1"/>
+          </p:cNvCxnSpPr>
+          <p:nvPr>
+            <p:extLst>
+              <p:ext uri="{386F3935-93C4-4BCD-93E2-E3B085C9AB24}">
+                <p16:designElem xmlns:p16="http://schemas.microsoft.com/office/powerpoint/2015/main" val="1"/>
+              </p:ext>
+            </p:extLst>
+          </p:nvPr>
+        </p:nvCxnSpPr>
+        <p:spPr>
+          <a:xfrm rot="16200000">
+            <a:off x="7532813" y="5760720"/>
+            <a:ext cx="1188720" cy="0"/>
+          </a:xfrm>
+          <a:prstGeom prst="line">
+            <a:avLst/>
+          </a:prstGeom>
+          <a:ln w="19050">
+            <a:solidFill>
+              <a:schemeClr val="accent1"/>
+            </a:solidFill>
+          </a:ln>
+        </p:spPr>
+        <p:style>
+          <a:lnRef idx="1">
+            <a:schemeClr val="accent1"/>
+          </a:lnRef>
+          <a:fillRef idx="0">
+            <a:schemeClr val="accent1"/>
+          </a:fillRef>
+          <a:effectRef idx="0">
+            <a:schemeClr val="accent1"/>
+          </a:effectRef>
+          <a:fontRef idx="minor">
+            <a:schemeClr val="tx1"/>
+          </a:fontRef>
+        </p:style>
+      </p:cxnSp>
+      <p:pic>
+        <p:nvPicPr>
+          <p:cNvPr id="7" name="Content Placeholder 6" descr="A close up of a map&#10;&#10;Description automatically generated">
+            <a:extLst>
+              <a:ext uri="{FF2B5EF4-FFF2-40B4-BE49-F238E27FC236}">
+                <a16:creationId xmlns:a16="http://schemas.microsoft.com/office/drawing/2014/main" id="{EEE14E3A-B4C2-44B3-85D4-765E43125F84}"/>
+              </a:ext>
+            </a:extLst>
+          </p:cNvPr>
+          <p:cNvPicPr>
+            <a:picLocks noGrp="1" noChangeAspect="1"/>
+          </p:cNvPicPr>
+          <p:nvPr>
+            <p:ph idx="1"/>
+          </p:nvPr>
+        </p:nvPicPr>
+        <p:blipFill>
+          <a:blip r:embed="rId2">
+            <a:extLst>
+              <a:ext uri="{28A0092B-C50C-407E-A947-70E740481C1C}">
+                <a14:useLocalDpi xmlns:a14="http://schemas.microsoft.com/office/drawing/2010/main" val="0"/>
+              </a:ext>
+            </a:extLst>
+          </a:blip>
+          <a:stretch>
+            <a:fillRect/>
+          </a:stretch>
+        </p:blipFill>
+        <p:spPr>
+          <a:xfrm>
+            <a:off x="50188" y="45720"/>
+            <a:ext cx="12190459" cy="4869356"/>
+          </a:xfrm>
+        </p:spPr>
+      </p:pic>
+      <p:sp>
+        <p:nvSpPr>
+          <p:cNvPr id="9" name="TextBox 8">
+            <a:extLst>
+              <a:ext uri="{FF2B5EF4-FFF2-40B4-BE49-F238E27FC236}">
+                <a16:creationId xmlns:a16="http://schemas.microsoft.com/office/drawing/2014/main" id="{D3EF6F36-F6B8-4B7F-8CD4-A2C263245218}"/>
+              </a:ext>
+            </a:extLst>
+          </p:cNvPr>
+          <p:cNvSpPr txBox="1"/>
+          <p:nvPr/>
+        </p:nvSpPr>
+        <p:spPr>
+          <a:xfrm>
+            <a:off x="3447466" y="933062"/>
+            <a:ext cx="5395901" cy="369332"/>
+          </a:xfrm>
+          <a:prstGeom prst="rect">
+            <a:avLst/>
+          </a:prstGeom>
+          <a:noFill/>
+        </p:spPr>
+        <p:txBody>
+          <a:bodyPr wrap="none" rtlCol="0">
+            <a:spAutoFit/>
+          </a:bodyPr>
+          <a:lstStyle/>
+          <a:p>
+            <a:r>
+              <a:rPr lang="en-US" dirty="0">
+                <a:solidFill>
+                  <a:srgbClr val="FF0000"/>
+                </a:solidFill>
+              </a:rPr>
+              <a:t>Around 11% of the global population is undernourished</a:t>
+            </a:r>
+            <a:endParaRPr lang="it-IT" dirty="0">
+              <a:solidFill>
+                <a:srgbClr val="FF0000"/>
+              </a:solidFill>
+            </a:endParaRPr>
+          </a:p>
+        </p:txBody>
+      </p:sp>
+    </p:spTree>
+    <p:extLst>
+      <p:ext uri="{BB962C8B-B14F-4D97-AF65-F5344CB8AC3E}">
+        <p14:creationId xmlns:p14="http://schemas.microsoft.com/office/powerpoint/2010/main" val="113839371"/>
+      </p:ext>
+    </p:extLst>
+  </p:cSld>
+  <p:clrMapOvr>
+    <a:overrideClrMapping bg1="dk1" tx1="lt1" bg2="dk2" tx2="lt2" accent1="accent1" accent2="accent2" accent3="accent3" accent4="accent4" accent5="accent5" accent6="accent6" hlink="hlink" folHlink="folHlink"/>
+  </p:clrMapOvr>
+</p:sld>
+</file>
+
+<file path=ppt/slides/slide4.xml><?xml version="1.0" encoding="utf-8"?>
+<p:sld xmlns:a="http://schemas.openxmlformats.org/drawingml/2006/main" xmlns:r="http://schemas.openxmlformats.org/officeDocument/2006/relationships" xmlns:p="http://schemas.openxmlformats.org/presentationml/2006/main">
+  <p:cSld>
+    <p:spTree>
+      <p:nvGrpSpPr>
+        <p:cNvPr id="1" name=""/>
+        <p:cNvGrpSpPr/>
+        <p:nvPr/>
+      </p:nvGrpSpPr>
+      <p:grpSpPr>
+        <a:xfrm>
+          <a:off x="0" y="0"/>
+          <a:ext cx="0" cy="0"/>
+          <a:chOff x="0" y="0"/>
+          <a:chExt cx="0" cy="0"/>
+        </a:xfrm>
+      </p:grpSpPr>
+      <p:sp>
+        <p:nvSpPr>
+          <p:cNvPr id="2" name="Title 1">
+            <a:extLst>
+              <a:ext uri="{FF2B5EF4-FFF2-40B4-BE49-F238E27FC236}">
+                <a16:creationId xmlns:a16="http://schemas.microsoft.com/office/drawing/2014/main" id="{CA220DAE-D661-420C-BC4D-A828DF6727D9}"/>
+              </a:ext>
+            </a:extLst>
+          </p:cNvPr>
+          <p:cNvSpPr>
+            <a:spLocks noGrp="1"/>
+          </p:cNvSpPr>
+          <p:nvPr>
+            <p:ph type="title"/>
+          </p:nvPr>
+        </p:nvSpPr>
+        <p:spPr/>
+        <p:txBody>
+          <a:bodyPr/>
+          <a:lstStyle/>
+          <a:p>
+            <a:r>
+              <a:rPr lang="en-US" dirty="0"/>
+              <a:t>There are many causes of HUNGER</a:t>
+            </a:r>
+            <a:endParaRPr lang="it-IT" dirty="0"/>
+          </a:p>
+        </p:txBody>
+      </p:sp>
+      <p:sp>
+        <p:nvSpPr>
+          <p:cNvPr id="3" name="Text Placeholder 2">
+            <a:extLst>
+              <a:ext uri="{FF2B5EF4-FFF2-40B4-BE49-F238E27FC236}">
+                <a16:creationId xmlns:a16="http://schemas.microsoft.com/office/drawing/2014/main" id="{C145CD10-7815-4A0F-8EBE-15784D35C3E6}"/>
+              </a:ext>
+            </a:extLst>
+          </p:cNvPr>
+          <p:cNvSpPr>
+            <a:spLocks noGrp="1"/>
+          </p:cNvSpPr>
+          <p:nvPr>
+            <p:ph type="body" idx="1"/>
+          </p:nvPr>
+        </p:nvSpPr>
+        <p:spPr/>
+        <p:txBody>
+          <a:bodyPr/>
+          <a:lstStyle/>
+          <a:p>
+            <a:endParaRPr lang="it-IT"/>
+          </a:p>
+        </p:txBody>
+      </p:sp>
+    </p:spTree>
+    <p:extLst>
+      <p:ext uri="{BB962C8B-B14F-4D97-AF65-F5344CB8AC3E}">
+        <p14:creationId xmlns:p14="http://schemas.microsoft.com/office/powerpoint/2010/main" val="3564309828"/>
+      </p:ext>
+    </p:extLst>
+  </p:cSld>
+  <p:clrMapOvr>
     <a:masterClrMapping/>
+  </p:clrMapOvr>
+</p:sld>
+</file>
+
+<file path=ppt/slides/slide5.xml><?xml version="1.0" encoding="utf-8"?>
+<p:sld xmlns:a="http://schemas.openxmlformats.org/drawingml/2006/main" xmlns:r="http://schemas.openxmlformats.org/officeDocument/2006/relationships" xmlns:p="http://schemas.openxmlformats.org/presentationml/2006/main">
+  <p:cSld>
+    <p:bg>
+      <p:bgPr>
+        <a:solidFill>
+          <a:schemeClr val="bg1"/>
+        </a:solidFill>
+        <a:effectLst/>
+      </p:bgPr>
+    </p:bg>
+    <p:spTree>
+      <p:nvGrpSpPr>
+        <p:cNvPr id="1" name=""/>
+        <p:cNvGrpSpPr/>
+        <p:nvPr/>
+      </p:nvGrpSpPr>
+      <p:grpSpPr>
+        <a:xfrm>
+          <a:off x="0" y="0"/>
+          <a:ext cx="0" cy="0"/>
+          <a:chOff x="0" y="0"/>
+          <a:chExt cx="0" cy="0"/>
+        </a:xfrm>
+      </p:grpSpPr>
+      <p:sp useBgFill="1">
+        <p:nvSpPr>
+          <p:cNvPr id="55" name="Rectangle 54">
+            <a:extLst>
+              <a:ext uri="{FF2B5EF4-FFF2-40B4-BE49-F238E27FC236}">
+                <a16:creationId xmlns:a16="http://schemas.microsoft.com/office/drawing/2014/main" id="{990D0034-F768-41E7-85D4-F38C4DE85770}"/>
+              </a:ext>
+              <a:ext uri="{C183D7F6-B498-43B3-948B-1728B52AA6E4}">
+                <adec:decorative xmlns:adec="http://schemas.microsoft.com/office/drawing/2017/decorative" val="1"/>
+              </a:ext>
+            </a:extLst>
+          </p:cNvPr>
+          <p:cNvSpPr>
+            <a:spLocks noGrp="1" noRot="1" noChangeAspect="1" noMove="1" noResize="1" noEditPoints="1" noAdjustHandles="1" noChangeArrowheads="1" noChangeShapeType="1" noTextEdit="1"/>
+          </p:cNvSpPr>
+          <p:nvPr>
+            <p:extLst>
+              <p:ext uri="{386F3935-93C4-4BCD-93E2-E3B085C9AB24}">
+                <p16:designElem xmlns:p16="http://schemas.microsoft.com/office/powerpoint/2015/main" val="1"/>
+              </p:ext>
+            </p:extLst>
+          </p:nvPr>
+        </p:nvSpPr>
+        <p:spPr>
+          <a:xfrm>
+            <a:off x="0" y="0"/>
+            <a:ext cx="12186315" cy="6858000"/>
+          </a:xfrm>
+          <a:prstGeom prst="rect">
+            <a:avLst/>
+          </a:prstGeom>
+          <a:ln>
+            <a:noFill/>
+          </a:ln>
+        </p:spPr>
+        <p:style>
+          <a:lnRef idx="2">
+            <a:schemeClr val="accent6">
+              <a:shade val="50000"/>
+            </a:schemeClr>
+          </a:lnRef>
+          <a:fillRef idx="1001">
+            <a:schemeClr val="lt1"/>
+          </a:fillRef>
+          <a:effectRef idx="0">
+            <a:schemeClr val="accent6"/>
+          </a:effectRef>
+          <a:fontRef idx="minor">
+            <a:schemeClr val="lt1"/>
+          </a:fontRef>
+        </p:style>
+        <p:txBody>
+          <a:bodyPr rtlCol="0" anchor="ctr"/>
+          <a:lstStyle/>
+          <a:p>
+            <a:pPr algn="ctr"/>
+            <a:endParaRPr lang="en-US" dirty="0"/>
+          </a:p>
+        </p:txBody>
+      </p:sp>
+      <p:pic>
+        <p:nvPicPr>
+          <p:cNvPr id="13" name="Content Placeholder 12" descr="A picture containing building, outdoor, man, truck&#10;&#10;Description automatically generated">
+            <a:extLst>
+              <a:ext uri="{FF2B5EF4-FFF2-40B4-BE49-F238E27FC236}">
+                <a16:creationId xmlns:a16="http://schemas.microsoft.com/office/drawing/2014/main" id="{FA095AC3-4EC6-4075-A68A-D41C718371FE}"/>
+              </a:ext>
+            </a:extLst>
+          </p:cNvPr>
+          <p:cNvPicPr>
+            <a:picLocks noChangeAspect="1"/>
+          </p:cNvPicPr>
+          <p:nvPr/>
+        </p:nvPicPr>
+        <p:blipFill rotWithShape="1">
+          <a:blip r:embed="rId2">
+            <a:extLst>
+              <a:ext uri="{28A0092B-C50C-407E-A947-70E740481C1C}">
+                <a14:useLocalDpi xmlns:a14="http://schemas.microsoft.com/office/drawing/2010/main" val="0"/>
+              </a:ext>
+            </a:extLst>
+          </a:blip>
+          <a:srcRect t="5286" r="1" b="10089"/>
+          <a:stretch/>
+        </p:blipFill>
+        <p:spPr>
+          <a:xfrm>
+            <a:off x="20" y="10"/>
+            <a:ext cx="12186295" cy="6857990"/>
+          </a:xfrm>
+          <a:prstGeom prst="rect">
+            <a:avLst/>
+          </a:prstGeom>
+        </p:spPr>
+      </p:pic>
+      <p:sp>
+        <p:nvSpPr>
+          <p:cNvPr id="57" name="Rectangle 56">
+            <a:extLst>
+              <a:ext uri="{FF2B5EF4-FFF2-40B4-BE49-F238E27FC236}">
+                <a16:creationId xmlns:a16="http://schemas.microsoft.com/office/drawing/2014/main" id="{95B38FD6-641F-41BF-B466-C1C6366420F0}"/>
+              </a:ext>
+              <a:ext uri="{C183D7F6-B498-43B3-948B-1728B52AA6E4}">
+                <adec:decorative xmlns:adec="http://schemas.microsoft.com/office/drawing/2017/decorative" val="1"/>
+              </a:ext>
+            </a:extLst>
+          </p:cNvPr>
+          <p:cNvSpPr>
+            <a:spLocks noGrp="1" noRot="1" noChangeAspect="1" noMove="1" noResize="1" noEditPoints="1" noAdjustHandles="1" noChangeArrowheads="1" noChangeShapeType="1" noTextEdit="1"/>
+          </p:cNvSpPr>
+          <p:nvPr>
+            <p:extLst>
+              <p:ext uri="{386F3935-93C4-4BCD-93E2-E3B085C9AB24}">
+                <p16:designElem xmlns:p16="http://schemas.microsoft.com/office/powerpoint/2015/main" val="1"/>
+              </p:ext>
+            </p:extLst>
+          </p:nvPr>
+        </p:nvSpPr>
+        <p:spPr>
+          <a:xfrm>
+            <a:off x="7848599" y="1238442"/>
+            <a:ext cx="3635926" cy="4355751"/>
+          </a:xfrm>
+          <a:prstGeom prst="rect">
+            <a:avLst/>
+          </a:prstGeom>
+          <a:solidFill>
+            <a:srgbClr val="000000">
+              <a:alpha val="79000"/>
+            </a:srgbClr>
+          </a:solidFill>
+          <a:ln>
+            <a:noFill/>
+          </a:ln>
+        </p:spPr>
+        <p:style>
+          <a:lnRef idx="2">
+            <a:schemeClr val="accent1">
+              <a:shade val="50000"/>
+            </a:schemeClr>
+          </a:lnRef>
+          <a:fillRef idx="1">
+            <a:schemeClr val="accent1"/>
+          </a:fillRef>
+          <a:effectRef idx="0">
+            <a:schemeClr val="accent1"/>
+          </a:effectRef>
+          <a:fontRef idx="minor">
+            <a:schemeClr val="lt1"/>
+          </a:fontRef>
+        </p:style>
+        <p:txBody>
+          <a:bodyPr rtlCol="0" anchor="ctr"/>
+          <a:lstStyle/>
+          <a:p>
+            <a:pPr algn="ctr"/>
+            <a:endParaRPr lang="en-US"/>
+          </a:p>
+        </p:txBody>
+      </p:sp>
+      <p:sp>
+        <p:nvSpPr>
+          <p:cNvPr id="2" name="Title 1">
+            <a:extLst>
+              <a:ext uri="{FF2B5EF4-FFF2-40B4-BE49-F238E27FC236}">
+                <a16:creationId xmlns:a16="http://schemas.microsoft.com/office/drawing/2014/main" id="{BA7C13DF-B12E-4D86-B899-E2B482090FF2}"/>
+              </a:ext>
+            </a:extLst>
+          </p:cNvPr>
+          <p:cNvSpPr>
+            <a:spLocks noGrp="1"/>
+          </p:cNvSpPr>
+          <p:nvPr>
+            <p:ph type="title"/>
+          </p:nvPr>
+        </p:nvSpPr>
+        <p:spPr>
+          <a:xfrm>
+            <a:off x="8089772" y="1419273"/>
+            <a:ext cx="3153580" cy="1358188"/>
+          </a:xfrm>
+        </p:spPr>
+        <p:txBody>
+          <a:bodyPr vert="horz" lIns="91440" tIns="45720" rIns="91440" bIns="45720" rtlCol="0">
+            <a:normAutofit/>
+          </a:bodyPr>
+          <a:lstStyle/>
+          <a:p>
+            <a:r>
+              <a:rPr lang="en-US" sz="1700">
+                <a:solidFill>
+                  <a:srgbClr val="FFFFFF"/>
+                </a:solidFill>
+              </a:rPr>
+              <a:t>Absolute Poverty</a:t>
+            </a:r>
+            <a:br>
+              <a:rPr lang="en-US" sz="1700">
+                <a:solidFill>
+                  <a:srgbClr val="FFFFFF"/>
+                </a:solidFill>
+              </a:rPr>
+            </a:br>
+            <a:r>
+              <a:rPr lang="en-US" sz="1700">
+                <a:solidFill>
+                  <a:srgbClr val="FFFFFF"/>
+                </a:solidFill>
+              </a:rPr>
+              <a:t>The complete lack of the means necessary to meet basic personal needs, such as food, clothing and shelter(Wikipedia)</a:t>
+            </a:r>
+          </a:p>
+        </p:txBody>
+      </p:sp>
+      <p:cxnSp>
+        <p:nvCxnSpPr>
+          <p:cNvPr id="59" name="Straight Connector 58">
+            <a:extLst>
+              <a:ext uri="{FF2B5EF4-FFF2-40B4-BE49-F238E27FC236}">
+                <a16:creationId xmlns:a16="http://schemas.microsoft.com/office/drawing/2014/main" id="{6BF9119E-766E-4526-AAE5-639F577C0493}"/>
+              </a:ext>
+              <a:ext uri="{C183D7F6-B498-43B3-948B-1728B52AA6E4}">
+                <adec:decorative xmlns:adec="http://schemas.microsoft.com/office/drawing/2017/decorative" val="1"/>
+              </a:ext>
+            </a:extLst>
+          </p:cNvPr>
+          <p:cNvCxnSpPr>
+            <a:cxnSpLocks noGrp="1" noRot="1" noChangeAspect="1" noMove="1" noResize="1" noEditPoints="1" noAdjustHandles="1" noChangeArrowheads="1" noChangeShapeType="1"/>
+          </p:cNvCxnSpPr>
+          <p:nvPr>
+            <p:extLst>
+              <p:ext uri="{386F3935-93C4-4BCD-93E2-E3B085C9AB24}">
+                <p16:designElem xmlns:p16="http://schemas.microsoft.com/office/powerpoint/2015/main" val="1"/>
+              </p:ext>
+            </p:extLst>
+          </p:nvPr>
+        </p:nvCxnSpPr>
+        <p:spPr>
+          <a:xfrm>
+            <a:off x="8173792" y="2865016"/>
+            <a:ext cx="2926080" cy="0"/>
+          </a:xfrm>
+          <a:prstGeom prst="line">
+            <a:avLst/>
+          </a:prstGeom>
+          <a:ln w="19050">
+            <a:solidFill>
+              <a:schemeClr val="accent1"/>
+            </a:solidFill>
+          </a:ln>
+        </p:spPr>
+        <p:style>
+          <a:lnRef idx="1">
+            <a:schemeClr val="accent1"/>
+          </a:lnRef>
+          <a:fillRef idx="0">
+            <a:schemeClr val="accent1"/>
+          </a:fillRef>
+          <a:effectRef idx="0">
+            <a:schemeClr val="accent1"/>
+          </a:effectRef>
+          <a:fontRef idx="minor">
+            <a:schemeClr val="tx1"/>
+          </a:fontRef>
+        </p:style>
+      </p:cxnSp>
+      <p:sp>
+        <p:nvSpPr>
+          <p:cNvPr id="52" name="Content Placeholder 51">
+            <a:extLst>
+              <a:ext uri="{FF2B5EF4-FFF2-40B4-BE49-F238E27FC236}">
+                <a16:creationId xmlns:a16="http://schemas.microsoft.com/office/drawing/2014/main" id="{5C34FDAB-008D-4997-B256-C3B8B4899CDA}"/>
+              </a:ext>
+            </a:extLst>
+          </p:cNvPr>
+          <p:cNvSpPr>
+            <a:spLocks noGrp="1"/>
+          </p:cNvSpPr>
+          <p:nvPr>
+            <p:ph idx="1"/>
+          </p:nvPr>
+        </p:nvSpPr>
+        <p:spPr>
+          <a:xfrm>
+            <a:off x="8089772" y="2978254"/>
+            <a:ext cx="3153580" cy="2444238"/>
+          </a:xfrm>
+        </p:spPr>
+        <p:txBody>
+          <a:bodyPr>
+            <a:normAutofit/>
+          </a:bodyPr>
+          <a:lstStyle/>
+          <a:p>
+            <a:endParaRPr lang="en-US" sz="1600">
+              <a:solidFill>
+                <a:srgbClr val="FFFFFF"/>
+              </a:solidFill>
+            </a:endParaRPr>
+          </a:p>
+        </p:txBody>
+      </p:sp>
+      <p:sp>
+        <p:nvSpPr>
+          <p:cNvPr id="61" name="Rectangle 60">
+            <a:extLst>
+              <a:ext uri="{FF2B5EF4-FFF2-40B4-BE49-F238E27FC236}">
+                <a16:creationId xmlns:a16="http://schemas.microsoft.com/office/drawing/2014/main" id="{7363FFA6-C551-4935-A474-8B2482E55BAC}"/>
+              </a:ext>
+              <a:ext uri="{C183D7F6-B498-43B3-948B-1728B52AA6E4}">
+                <adec:decorative xmlns:adec="http://schemas.microsoft.com/office/drawing/2017/decorative" val="1"/>
+              </a:ext>
+            </a:extLst>
+          </p:cNvPr>
+          <p:cNvSpPr>
+            <a:spLocks noGrp="1" noRot="1" noChangeAspect="1" noMove="1" noResize="1" noEditPoints="1" noAdjustHandles="1" noChangeArrowheads="1" noChangeShapeType="1" noTextEdit="1"/>
+          </p:cNvSpPr>
+          <p:nvPr>
+            <p:extLst>
+              <p:ext uri="{386F3935-93C4-4BCD-93E2-E3B085C9AB24}">
+                <p16:designElem xmlns:p16="http://schemas.microsoft.com/office/powerpoint/2015/main" val="1"/>
+              </p:ext>
+            </p:extLst>
+          </p:nvPr>
+        </p:nvSpPr>
+        <p:spPr>
+          <a:xfrm>
+            <a:off x="1" y="6400800"/>
+            <a:ext cx="12192000" cy="457200"/>
+          </a:xfrm>
+          <a:prstGeom prst="rect">
+            <a:avLst/>
+          </a:prstGeom>
+          <a:solidFill>
+            <a:srgbClr val="262626">
+              <a:alpha val="95000"/>
+            </a:srgbClr>
+          </a:solidFill>
+          <a:ln>
+            <a:noFill/>
+          </a:ln>
+        </p:spPr>
+        <p:style>
+          <a:lnRef idx="2">
+            <a:schemeClr val="accent1">
+              <a:shade val="50000"/>
+            </a:schemeClr>
+          </a:lnRef>
+          <a:fillRef idx="1">
+            <a:schemeClr val="accent1"/>
+          </a:fillRef>
+          <a:effectRef idx="0">
+            <a:schemeClr val="accent1"/>
+          </a:effectRef>
+          <a:fontRef idx="minor">
+            <a:schemeClr val="lt1"/>
+          </a:fontRef>
+        </p:style>
+      </p:sp>
+    </p:spTree>
+    <p:extLst>
+      <p:ext uri="{BB962C8B-B14F-4D97-AF65-F5344CB8AC3E}">
+        <p14:creationId xmlns:p14="http://schemas.microsoft.com/office/powerpoint/2010/main" val="3994096116"/>
+      </p:ext>
+    </p:extLst>
+  </p:cSld>
+  <p:clrMapOvr>
+    <a:overrideClrMapping bg1="dk1" tx1="lt1" bg2="dk2" tx2="lt2" accent1="accent1" accent2="accent2" accent3="accent3" accent4="accent4" accent5="accent5" accent6="accent6" hlink="hlink" folHlink="folHlink"/>
+  </p:clrMapOvr>
+</p:sld>
+</file>
+
+<file path=ppt/slides/slide6.xml><?xml version="1.0" encoding="utf-8"?>
+<p:sld xmlns:a="http://schemas.openxmlformats.org/drawingml/2006/main" xmlns:r="http://schemas.openxmlformats.org/officeDocument/2006/relationships" xmlns:p="http://schemas.openxmlformats.org/presentationml/2006/main">
+  <p:cSld>
+    <p:bg>
+      <p:bgPr>
+        <a:solidFill>
+          <a:schemeClr val="bg1"/>
+        </a:solidFill>
+        <a:effectLst/>
+      </p:bgPr>
+    </p:bg>
+    <p:spTree>
+      <p:nvGrpSpPr>
+        <p:cNvPr id="1" name=""/>
+        <p:cNvGrpSpPr/>
+        <p:nvPr/>
+      </p:nvGrpSpPr>
+      <p:grpSpPr>
+        <a:xfrm>
+          <a:off x="0" y="0"/>
+          <a:ext cx="0" cy="0"/>
+          <a:chOff x="0" y="0"/>
+          <a:chExt cx="0" cy="0"/>
+        </a:xfrm>
+      </p:grpSpPr>
+      <p:sp useBgFill="1">
+        <p:nvSpPr>
+          <p:cNvPr id="55" name="Rectangle 54">
+            <a:extLst>
+              <a:ext uri="{FF2B5EF4-FFF2-40B4-BE49-F238E27FC236}">
+                <a16:creationId xmlns:a16="http://schemas.microsoft.com/office/drawing/2014/main" id="{990D0034-F768-41E7-85D4-F38C4DE85770}"/>
+              </a:ext>
+              <a:ext uri="{C183D7F6-B498-43B3-948B-1728B52AA6E4}">
+                <adec:decorative xmlns:adec="http://schemas.microsoft.com/office/drawing/2017/decorative" val="1"/>
+              </a:ext>
+            </a:extLst>
+          </p:cNvPr>
+          <p:cNvSpPr>
+            <a:spLocks noGrp="1" noRot="1" noChangeAspect="1" noMove="1" noResize="1" noEditPoints="1" noAdjustHandles="1" noChangeArrowheads="1" noChangeShapeType="1" noTextEdit="1"/>
+          </p:cNvSpPr>
+          <p:nvPr>
+            <p:extLst>
+              <p:ext uri="{386F3935-93C4-4BCD-93E2-E3B085C9AB24}">
+                <p16:designElem xmlns:p16="http://schemas.microsoft.com/office/powerpoint/2015/main" val="1"/>
+              </p:ext>
+            </p:extLst>
+          </p:nvPr>
+        </p:nvSpPr>
+        <p:spPr>
+          <a:xfrm>
+            <a:off x="0" y="0"/>
+            <a:ext cx="12186315" cy="6858000"/>
+          </a:xfrm>
+          <a:prstGeom prst="rect">
+            <a:avLst/>
+          </a:prstGeom>
+          <a:ln>
+            <a:noFill/>
+          </a:ln>
+        </p:spPr>
+        <p:style>
+          <a:lnRef idx="2">
+            <a:schemeClr val="accent6">
+              <a:shade val="50000"/>
+            </a:schemeClr>
+          </a:lnRef>
+          <a:fillRef idx="1001">
+            <a:schemeClr val="lt1"/>
+          </a:fillRef>
+          <a:effectRef idx="0">
+            <a:schemeClr val="accent6"/>
+          </a:effectRef>
+          <a:fontRef idx="minor">
+            <a:schemeClr val="lt1"/>
+          </a:fontRef>
+        </p:style>
+        <p:txBody>
+          <a:bodyPr rtlCol="0" anchor="ctr"/>
+          <a:lstStyle/>
+          <a:p>
+            <a:pPr algn="ctr"/>
+            <a:endParaRPr lang="en-US" dirty="0"/>
+          </a:p>
+        </p:txBody>
+      </p:sp>
+      <p:pic>
+        <p:nvPicPr>
+          <p:cNvPr id="6" name="Content Placeholder 5" descr="A picture containing person, sitting, man, table&#10;&#10;Description automatically generated">
+            <a:extLst>
+              <a:ext uri="{FF2B5EF4-FFF2-40B4-BE49-F238E27FC236}">
+                <a16:creationId xmlns:a16="http://schemas.microsoft.com/office/drawing/2014/main" id="{5DDC648E-9F97-40A2-9883-FC227D719610}"/>
+              </a:ext>
+            </a:extLst>
+          </p:cNvPr>
+          <p:cNvPicPr>
+            <a:picLocks noChangeAspect="1"/>
+          </p:cNvPicPr>
+          <p:nvPr/>
+        </p:nvPicPr>
+        <p:blipFill rotWithShape="1">
+          <a:blip r:embed="rId2">
+            <a:extLst>
+              <a:ext uri="{28A0092B-C50C-407E-A947-70E740481C1C}">
+                <a14:useLocalDpi xmlns:a14="http://schemas.microsoft.com/office/drawing/2010/main" val="0"/>
+              </a:ext>
+            </a:extLst>
+          </a:blip>
+          <a:srcRect l="491"/>
+          <a:stretch/>
+        </p:blipFill>
+        <p:spPr>
+          <a:xfrm>
+            <a:off x="20" y="10"/>
+            <a:ext cx="12186295" cy="6857990"/>
+          </a:xfrm>
+          <a:prstGeom prst="rect">
+            <a:avLst/>
+          </a:prstGeom>
+        </p:spPr>
+      </p:pic>
+      <p:sp>
+        <p:nvSpPr>
+          <p:cNvPr id="57" name="Rectangle 56">
+            <a:extLst>
+              <a:ext uri="{FF2B5EF4-FFF2-40B4-BE49-F238E27FC236}">
+                <a16:creationId xmlns:a16="http://schemas.microsoft.com/office/drawing/2014/main" id="{95B38FD6-641F-41BF-B466-C1C6366420F0}"/>
+              </a:ext>
+              <a:ext uri="{C183D7F6-B498-43B3-948B-1728B52AA6E4}">
+                <adec:decorative xmlns:adec="http://schemas.microsoft.com/office/drawing/2017/decorative" val="1"/>
+              </a:ext>
+            </a:extLst>
+          </p:cNvPr>
+          <p:cNvSpPr>
+            <a:spLocks noGrp="1" noRot="1" noChangeAspect="1" noMove="1" noResize="1" noEditPoints="1" noAdjustHandles="1" noChangeArrowheads="1" noChangeShapeType="1" noTextEdit="1"/>
+          </p:cNvSpPr>
+          <p:nvPr>
+            <p:extLst>
+              <p:ext uri="{386F3935-93C4-4BCD-93E2-E3B085C9AB24}">
+                <p16:designElem xmlns:p16="http://schemas.microsoft.com/office/powerpoint/2015/main" val="1"/>
+              </p:ext>
+            </p:extLst>
+          </p:nvPr>
+        </p:nvSpPr>
+        <p:spPr>
+          <a:xfrm>
+            <a:off x="7848599" y="1238442"/>
+            <a:ext cx="3635926" cy="4355751"/>
+          </a:xfrm>
+          <a:prstGeom prst="rect">
+            <a:avLst/>
+          </a:prstGeom>
+          <a:solidFill>
+            <a:srgbClr val="000000">
+              <a:alpha val="79000"/>
+            </a:srgbClr>
+          </a:solidFill>
+          <a:ln>
+            <a:noFill/>
+          </a:ln>
+        </p:spPr>
+        <p:style>
+          <a:lnRef idx="2">
+            <a:schemeClr val="accent1">
+              <a:shade val="50000"/>
+            </a:schemeClr>
+          </a:lnRef>
+          <a:fillRef idx="1">
+            <a:schemeClr val="accent1"/>
+          </a:fillRef>
+          <a:effectRef idx="0">
+            <a:schemeClr val="accent1"/>
+          </a:effectRef>
+          <a:fontRef idx="minor">
+            <a:schemeClr val="lt1"/>
+          </a:fontRef>
+        </p:style>
+        <p:txBody>
+          <a:bodyPr rtlCol="0" anchor="ctr"/>
+          <a:lstStyle/>
+          <a:p>
+            <a:pPr algn="ctr"/>
+            <a:endParaRPr lang="en-US"/>
+          </a:p>
+        </p:txBody>
+      </p:sp>
+      <p:sp>
+        <p:nvSpPr>
+          <p:cNvPr id="2" name="Title 1">
+            <a:extLst>
+              <a:ext uri="{FF2B5EF4-FFF2-40B4-BE49-F238E27FC236}">
+                <a16:creationId xmlns:a16="http://schemas.microsoft.com/office/drawing/2014/main" id="{BA7C13DF-B12E-4D86-B899-E2B482090FF2}"/>
+              </a:ext>
+            </a:extLst>
+          </p:cNvPr>
+          <p:cNvSpPr>
+            <a:spLocks noGrp="1"/>
+          </p:cNvSpPr>
+          <p:nvPr>
+            <p:ph type="title"/>
+          </p:nvPr>
+        </p:nvSpPr>
+        <p:spPr>
+          <a:xfrm>
+            <a:off x="8089772" y="1419273"/>
+            <a:ext cx="3153580" cy="1358188"/>
+          </a:xfrm>
+        </p:spPr>
+        <p:txBody>
+          <a:bodyPr vert="horz" lIns="91440" tIns="45720" rIns="91440" bIns="45720" rtlCol="0">
+            <a:normAutofit/>
+          </a:bodyPr>
+          <a:lstStyle/>
+          <a:p>
+            <a:r>
+              <a:rPr lang="en-US" sz="1700" dirty="0">
+                <a:solidFill>
+                  <a:srgbClr val="FFFFFF"/>
+                </a:solidFill>
+              </a:rPr>
+              <a:t>Food Shortage</a:t>
+            </a:r>
+            <a:br>
+              <a:rPr lang="en-US" sz="1700" dirty="0">
+                <a:solidFill>
+                  <a:srgbClr val="FFFFFF"/>
+                </a:solidFill>
+              </a:rPr>
+            </a:br>
+            <a:endParaRPr lang="en-US" sz="1700" dirty="0">
+              <a:solidFill>
+                <a:srgbClr val="FFFFFF"/>
+              </a:solidFill>
+            </a:endParaRPr>
+          </a:p>
+        </p:txBody>
+      </p:sp>
+      <p:cxnSp>
+        <p:nvCxnSpPr>
+          <p:cNvPr id="59" name="Straight Connector 58">
+            <a:extLst>
+              <a:ext uri="{FF2B5EF4-FFF2-40B4-BE49-F238E27FC236}">
+                <a16:creationId xmlns:a16="http://schemas.microsoft.com/office/drawing/2014/main" id="{6BF9119E-766E-4526-AAE5-639F577C0493}"/>
+              </a:ext>
+              <a:ext uri="{C183D7F6-B498-43B3-948B-1728B52AA6E4}">
+                <adec:decorative xmlns:adec="http://schemas.microsoft.com/office/drawing/2017/decorative" val="1"/>
+              </a:ext>
+            </a:extLst>
+          </p:cNvPr>
+          <p:cNvCxnSpPr>
+            <a:cxnSpLocks noGrp="1" noRot="1" noChangeAspect="1" noMove="1" noResize="1" noEditPoints="1" noAdjustHandles="1" noChangeArrowheads="1" noChangeShapeType="1"/>
+          </p:cNvCxnSpPr>
+          <p:nvPr>
+            <p:extLst>
+              <p:ext uri="{386F3935-93C4-4BCD-93E2-E3B085C9AB24}">
+                <p16:designElem xmlns:p16="http://schemas.microsoft.com/office/powerpoint/2015/main" val="1"/>
+              </p:ext>
+            </p:extLst>
+          </p:nvPr>
+        </p:nvCxnSpPr>
+        <p:spPr>
+          <a:xfrm>
+            <a:off x="8173792" y="2865016"/>
+            <a:ext cx="2926080" cy="0"/>
+          </a:xfrm>
+          <a:prstGeom prst="line">
+            <a:avLst/>
+          </a:prstGeom>
+          <a:ln w="19050">
+            <a:solidFill>
+              <a:schemeClr val="accent1"/>
+            </a:solidFill>
+          </a:ln>
+        </p:spPr>
+        <p:style>
+          <a:lnRef idx="1">
+            <a:schemeClr val="accent1"/>
+          </a:lnRef>
+          <a:fillRef idx="0">
+            <a:schemeClr val="accent1"/>
+          </a:fillRef>
+          <a:effectRef idx="0">
+            <a:schemeClr val="accent1"/>
+          </a:effectRef>
+          <a:fontRef idx="minor">
+            <a:schemeClr val="tx1"/>
+          </a:fontRef>
+        </p:style>
+      </p:cxnSp>
+      <p:sp>
+        <p:nvSpPr>
+          <p:cNvPr id="52" name="Content Placeholder 51">
+            <a:extLst>
+              <a:ext uri="{FF2B5EF4-FFF2-40B4-BE49-F238E27FC236}">
+                <a16:creationId xmlns:a16="http://schemas.microsoft.com/office/drawing/2014/main" id="{3DB976E6-9198-41BF-AE01-10D42CF7D15A}"/>
+              </a:ext>
+            </a:extLst>
+          </p:cNvPr>
+          <p:cNvSpPr>
+            <a:spLocks noGrp="1"/>
+          </p:cNvSpPr>
+          <p:nvPr>
+            <p:ph idx="1"/>
+          </p:nvPr>
+        </p:nvSpPr>
+        <p:spPr>
+          <a:xfrm>
+            <a:off x="8089772" y="2978254"/>
+            <a:ext cx="3153580" cy="2444238"/>
+          </a:xfrm>
+        </p:spPr>
+        <p:txBody>
+          <a:bodyPr>
+            <a:normAutofit/>
+          </a:bodyPr>
+          <a:lstStyle/>
+          <a:p>
+            <a:endParaRPr lang="en-US" sz="1600" dirty="0">
+              <a:solidFill>
+                <a:srgbClr val="FFFFFF"/>
+              </a:solidFill>
+            </a:endParaRPr>
+          </a:p>
+        </p:txBody>
+      </p:sp>
+      <p:sp>
+        <p:nvSpPr>
+          <p:cNvPr id="61" name="Rectangle 60">
+            <a:extLst>
+              <a:ext uri="{FF2B5EF4-FFF2-40B4-BE49-F238E27FC236}">
+                <a16:creationId xmlns:a16="http://schemas.microsoft.com/office/drawing/2014/main" id="{7363FFA6-C551-4935-A474-8B2482E55BAC}"/>
+              </a:ext>
+              <a:ext uri="{C183D7F6-B498-43B3-948B-1728B52AA6E4}">
+                <adec:decorative xmlns:adec="http://schemas.microsoft.com/office/drawing/2017/decorative" val="1"/>
+              </a:ext>
+            </a:extLst>
+          </p:cNvPr>
+          <p:cNvSpPr>
+            <a:spLocks noGrp="1" noRot="1" noChangeAspect="1" noMove="1" noResize="1" noEditPoints="1" noAdjustHandles="1" noChangeArrowheads="1" noChangeShapeType="1" noTextEdit="1"/>
+          </p:cNvSpPr>
+          <p:nvPr>
+            <p:extLst>
+              <p:ext uri="{386F3935-93C4-4BCD-93E2-E3B085C9AB24}">
+                <p16:designElem xmlns:p16="http://schemas.microsoft.com/office/powerpoint/2015/main" val="1"/>
+              </p:ext>
+            </p:extLst>
+          </p:nvPr>
+        </p:nvSpPr>
+        <p:spPr>
+          <a:xfrm>
+            <a:off x="1" y="6400800"/>
+            <a:ext cx="12192000" cy="457200"/>
+          </a:xfrm>
+          <a:prstGeom prst="rect">
+            <a:avLst/>
+          </a:prstGeom>
+          <a:solidFill>
+            <a:srgbClr val="262626">
+              <a:alpha val="95000"/>
+            </a:srgbClr>
+          </a:solidFill>
+          <a:ln>
+            <a:noFill/>
+          </a:ln>
+        </p:spPr>
+        <p:style>
+          <a:lnRef idx="2">
+            <a:schemeClr val="accent1">
+              <a:shade val="50000"/>
+            </a:schemeClr>
+          </a:lnRef>
+          <a:fillRef idx="1">
+            <a:schemeClr val="accent1"/>
+          </a:fillRef>
+          <a:effectRef idx="0">
+            <a:schemeClr val="accent1"/>
+          </a:effectRef>
+          <a:fontRef idx="minor">
+            <a:schemeClr val="lt1"/>
+          </a:fontRef>
+        </p:style>
+      </p:sp>
+    </p:spTree>
+    <p:extLst>
+      <p:ext uri="{BB962C8B-B14F-4D97-AF65-F5344CB8AC3E}">
+        <p14:creationId xmlns:p14="http://schemas.microsoft.com/office/powerpoint/2010/main" val="1898177312"/>
+      </p:ext>
+    </p:extLst>
+  </p:cSld>
+  <p:clrMapOvr>
+    <a:overrideClrMapping bg1="dk1" tx1="lt1" bg2="dk2" tx2="lt2" accent1="accent1" accent2="accent2" accent3="accent3" accent4="accent4" accent5="accent5" accent6="accent6" hlink="hlink" folHlink="folHlink"/>
+  </p:clrMapOvr>
+</p:sld>
+</file>
+
+<file path=ppt/slides/slide7.xml><?xml version="1.0" encoding="utf-8"?>
+<p:sld xmlns:a="http://schemas.openxmlformats.org/drawingml/2006/main" xmlns:r="http://schemas.openxmlformats.org/officeDocument/2006/relationships" xmlns:p="http://schemas.openxmlformats.org/presentationml/2006/main">
+  <p:cSld>
+    <p:bg>
+      <p:bgPr>
+        <a:solidFill>
+          <a:schemeClr val="bg1"/>
+        </a:solidFill>
+        <a:effectLst/>
+      </p:bgPr>
+    </p:bg>
+    <p:spTree>
+      <p:nvGrpSpPr>
+        <p:cNvPr id="1" name=""/>
+        <p:cNvGrpSpPr/>
+        <p:nvPr/>
+      </p:nvGrpSpPr>
+      <p:grpSpPr>
+        <a:xfrm>
+          <a:off x="0" y="0"/>
+          <a:ext cx="0" cy="0"/>
+          <a:chOff x="0" y="0"/>
+          <a:chExt cx="0" cy="0"/>
+        </a:xfrm>
+      </p:grpSpPr>
+      <p:sp useBgFill="1">
+        <p:nvSpPr>
+          <p:cNvPr id="55" name="Rectangle 54">
+            <a:extLst>
+              <a:ext uri="{FF2B5EF4-FFF2-40B4-BE49-F238E27FC236}">
+                <a16:creationId xmlns:a16="http://schemas.microsoft.com/office/drawing/2014/main" id="{990D0034-F768-41E7-85D4-F38C4DE85770}"/>
+              </a:ext>
+              <a:ext uri="{C183D7F6-B498-43B3-948B-1728B52AA6E4}">
+                <adec:decorative xmlns:adec="http://schemas.microsoft.com/office/drawing/2017/decorative" val="1"/>
+              </a:ext>
+            </a:extLst>
+          </p:cNvPr>
+          <p:cNvSpPr>
+            <a:spLocks noGrp="1" noRot="1" noChangeAspect="1" noMove="1" noResize="1" noEditPoints="1" noAdjustHandles="1" noChangeArrowheads="1" noChangeShapeType="1" noTextEdit="1"/>
+          </p:cNvSpPr>
+          <p:nvPr>
+            <p:extLst>
+              <p:ext uri="{386F3935-93C4-4BCD-93E2-E3B085C9AB24}">
+                <p16:designElem xmlns:p16="http://schemas.microsoft.com/office/powerpoint/2015/main" val="1"/>
+              </p:ext>
+            </p:extLst>
+          </p:nvPr>
+        </p:nvSpPr>
+        <p:spPr>
+          <a:xfrm>
+            <a:off x="0" y="0"/>
+            <a:ext cx="12186315" cy="6858000"/>
+          </a:xfrm>
+          <a:prstGeom prst="rect">
+            <a:avLst/>
+          </a:prstGeom>
+          <a:ln>
+            <a:noFill/>
+          </a:ln>
+        </p:spPr>
+        <p:style>
+          <a:lnRef idx="2">
+            <a:schemeClr val="accent6">
+              <a:shade val="50000"/>
+            </a:schemeClr>
+          </a:lnRef>
+          <a:fillRef idx="1001">
+            <a:schemeClr val="lt1"/>
+          </a:fillRef>
+          <a:effectRef idx="0">
+            <a:schemeClr val="accent6"/>
+          </a:effectRef>
+          <a:fontRef idx="minor">
+            <a:schemeClr val="lt1"/>
+          </a:fontRef>
+        </p:style>
+        <p:txBody>
+          <a:bodyPr rtlCol="0" anchor="ctr"/>
+          <a:lstStyle/>
+          <a:p>
+            <a:pPr algn="ctr"/>
+            <a:endParaRPr lang="en-US" dirty="0"/>
+          </a:p>
+        </p:txBody>
+      </p:sp>
+      <p:pic>
+        <p:nvPicPr>
+          <p:cNvPr id="4" name="Picture 3" descr="A picture containing outdoor, building, vegetable, food&#10;&#10;Description automatically generated">
+            <a:extLst>
+              <a:ext uri="{FF2B5EF4-FFF2-40B4-BE49-F238E27FC236}">
+                <a16:creationId xmlns:a16="http://schemas.microsoft.com/office/drawing/2014/main" id="{F83BDAE5-9B09-4B30-8BF6-6F4E234679DE}"/>
+              </a:ext>
+            </a:extLst>
+          </p:cNvPr>
+          <p:cNvPicPr>
+            <a:picLocks noChangeAspect="1"/>
+          </p:cNvPicPr>
+          <p:nvPr/>
+        </p:nvPicPr>
+        <p:blipFill>
+          <a:blip r:embed="rId2">
+            <a:extLst>
+              <a:ext uri="{28A0092B-C50C-407E-A947-70E740481C1C}">
+                <a14:useLocalDpi xmlns:a14="http://schemas.microsoft.com/office/drawing/2010/main" val="0"/>
+              </a:ext>
+            </a:extLst>
+          </a:blip>
+          <a:stretch>
+            <a:fillRect/>
+          </a:stretch>
+        </p:blipFill>
+        <p:spPr>
+          <a:xfrm>
+            <a:off x="5685" y="0"/>
+            <a:ext cx="12180630" cy="6400800"/>
+          </a:xfrm>
+          <a:prstGeom prst="rect">
+            <a:avLst/>
+          </a:prstGeom>
+        </p:spPr>
+      </p:pic>
+      <p:sp>
+        <p:nvSpPr>
+          <p:cNvPr id="57" name="Rectangle 56">
+            <a:extLst>
+              <a:ext uri="{FF2B5EF4-FFF2-40B4-BE49-F238E27FC236}">
+                <a16:creationId xmlns:a16="http://schemas.microsoft.com/office/drawing/2014/main" id="{95B38FD6-641F-41BF-B466-C1C6366420F0}"/>
+              </a:ext>
+              <a:ext uri="{C183D7F6-B498-43B3-948B-1728B52AA6E4}">
+                <adec:decorative xmlns:adec="http://schemas.microsoft.com/office/drawing/2017/decorative" val="1"/>
+              </a:ext>
+            </a:extLst>
+          </p:cNvPr>
+          <p:cNvSpPr>
+            <a:spLocks noGrp="1" noRot="1" noChangeAspect="1" noMove="1" noResize="1" noEditPoints="1" noAdjustHandles="1" noChangeArrowheads="1" noChangeShapeType="1" noTextEdit="1"/>
+          </p:cNvSpPr>
+          <p:nvPr>
+            <p:extLst>
+              <p:ext uri="{386F3935-93C4-4BCD-93E2-E3B085C9AB24}">
+                <p16:designElem xmlns:p16="http://schemas.microsoft.com/office/powerpoint/2015/main" val="1"/>
+              </p:ext>
+            </p:extLst>
+          </p:nvPr>
+        </p:nvSpPr>
+        <p:spPr>
+          <a:xfrm>
+            <a:off x="7848599" y="1238442"/>
+            <a:ext cx="3635926" cy="4355751"/>
+          </a:xfrm>
+          <a:prstGeom prst="rect">
+            <a:avLst/>
+          </a:prstGeom>
+          <a:solidFill>
+            <a:srgbClr val="000000">
+              <a:alpha val="79000"/>
+            </a:srgbClr>
+          </a:solidFill>
+          <a:ln>
+            <a:noFill/>
+          </a:ln>
+        </p:spPr>
+        <p:style>
+          <a:lnRef idx="2">
+            <a:schemeClr val="accent1">
+              <a:shade val="50000"/>
+            </a:schemeClr>
+          </a:lnRef>
+          <a:fillRef idx="1">
+            <a:schemeClr val="accent1"/>
+          </a:fillRef>
+          <a:effectRef idx="0">
+            <a:schemeClr val="accent1"/>
+          </a:effectRef>
+          <a:fontRef idx="minor">
+            <a:schemeClr val="lt1"/>
+          </a:fontRef>
+        </p:style>
+        <p:txBody>
+          <a:bodyPr rtlCol="0" anchor="ctr"/>
+          <a:lstStyle/>
+          <a:p>
+            <a:pPr algn="ctr"/>
+            <a:endParaRPr lang="en-US"/>
+          </a:p>
+        </p:txBody>
+      </p:sp>
+      <p:sp>
+        <p:nvSpPr>
+          <p:cNvPr id="2" name="Title 1">
+            <a:extLst>
+              <a:ext uri="{FF2B5EF4-FFF2-40B4-BE49-F238E27FC236}">
+                <a16:creationId xmlns:a16="http://schemas.microsoft.com/office/drawing/2014/main" id="{BA7C13DF-B12E-4D86-B899-E2B482090FF2}"/>
+              </a:ext>
+            </a:extLst>
+          </p:cNvPr>
+          <p:cNvSpPr>
+            <a:spLocks noGrp="1"/>
+          </p:cNvSpPr>
+          <p:nvPr>
+            <p:ph type="title"/>
+          </p:nvPr>
+        </p:nvSpPr>
+        <p:spPr>
+          <a:xfrm>
+            <a:off x="8089772" y="1419273"/>
+            <a:ext cx="3153580" cy="1358188"/>
+          </a:xfrm>
+        </p:spPr>
+        <p:txBody>
+          <a:bodyPr vert="horz" lIns="91440" tIns="45720" rIns="91440" bIns="45720" rtlCol="0">
+            <a:normAutofit/>
+          </a:bodyPr>
+          <a:lstStyle/>
+          <a:p>
+            <a:r>
+              <a:rPr lang="en-US" sz="1700" dirty="0">
+                <a:solidFill>
+                  <a:srgbClr val="FFFFFF"/>
+                </a:solidFill>
+              </a:rPr>
+              <a:t>Food Waste</a:t>
+            </a:r>
+            <a:br>
+              <a:rPr lang="en-US" sz="1700" dirty="0">
+                <a:solidFill>
+                  <a:srgbClr val="FFFFFF"/>
+                </a:solidFill>
+              </a:rPr>
+            </a:br>
+            <a:endParaRPr lang="en-US" sz="1700" dirty="0">
+              <a:solidFill>
+                <a:srgbClr val="FFFFFF"/>
+              </a:solidFill>
+            </a:endParaRPr>
+          </a:p>
+        </p:txBody>
+      </p:sp>
+      <p:cxnSp>
+        <p:nvCxnSpPr>
+          <p:cNvPr id="59" name="Straight Connector 58">
+            <a:extLst>
+              <a:ext uri="{FF2B5EF4-FFF2-40B4-BE49-F238E27FC236}">
+                <a16:creationId xmlns:a16="http://schemas.microsoft.com/office/drawing/2014/main" id="{6BF9119E-766E-4526-AAE5-639F577C0493}"/>
+              </a:ext>
+              <a:ext uri="{C183D7F6-B498-43B3-948B-1728B52AA6E4}">
+                <adec:decorative xmlns:adec="http://schemas.microsoft.com/office/drawing/2017/decorative" val="1"/>
+              </a:ext>
+            </a:extLst>
+          </p:cNvPr>
+          <p:cNvCxnSpPr>
+            <a:cxnSpLocks noGrp="1" noRot="1" noChangeAspect="1" noMove="1" noResize="1" noEditPoints="1" noAdjustHandles="1" noChangeArrowheads="1" noChangeShapeType="1"/>
+          </p:cNvCxnSpPr>
+          <p:nvPr>
+            <p:extLst>
+              <p:ext uri="{386F3935-93C4-4BCD-93E2-E3B085C9AB24}">
+                <p16:designElem xmlns:p16="http://schemas.microsoft.com/office/powerpoint/2015/main" val="1"/>
+              </p:ext>
+            </p:extLst>
+          </p:nvPr>
+        </p:nvCxnSpPr>
+        <p:spPr>
+          <a:xfrm>
+            <a:off x="8173792" y="2865016"/>
+            <a:ext cx="2926080" cy="0"/>
+          </a:xfrm>
+          <a:prstGeom prst="line">
+            <a:avLst/>
+          </a:prstGeom>
+          <a:ln w="19050">
+            <a:solidFill>
+              <a:schemeClr val="accent1"/>
+            </a:solidFill>
+          </a:ln>
+        </p:spPr>
+        <p:style>
+          <a:lnRef idx="1">
+            <a:schemeClr val="accent1"/>
+          </a:lnRef>
+          <a:fillRef idx="0">
+            <a:schemeClr val="accent1"/>
+          </a:fillRef>
+          <a:effectRef idx="0">
+            <a:schemeClr val="accent1"/>
+          </a:effectRef>
+          <a:fontRef idx="minor">
+            <a:schemeClr val="tx1"/>
+          </a:fontRef>
+        </p:style>
+      </p:cxnSp>
+      <p:sp>
+        <p:nvSpPr>
+          <p:cNvPr id="52" name="Content Placeholder 51">
+            <a:extLst>
+              <a:ext uri="{FF2B5EF4-FFF2-40B4-BE49-F238E27FC236}">
+                <a16:creationId xmlns:a16="http://schemas.microsoft.com/office/drawing/2014/main" id="{3DB976E6-9198-41BF-AE01-10D42CF7D15A}"/>
+              </a:ext>
+            </a:extLst>
+          </p:cNvPr>
+          <p:cNvSpPr>
+            <a:spLocks noGrp="1"/>
+          </p:cNvSpPr>
+          <p:nvPr>
+            <p:ph idx="1"/>
+          </p:nvPr>
+        </p:nvSpPr>
+        <p:spPr>
+          <a:xfrm>
+            <a:off x="8089772" y="2978254"/>
+            <a:ext cx="3153580" cy="2444238"/>
+          </a:xfrm>
+        </p:spPr>
+        <p:txBody>
+          <a:bodyPr>
+            <a:normAutofit/>
+          </a:bodyPr>
+          <a:lstStyle/>
+          <a:p>
+            <a:r>
+              <a:rPr lang="en-US" sz="1600" dirty="0">
+                <a:solidFill>
+                  <a:srgbClr val="FFFFFF"/>
+                </a:solidFill>
+              </a:rPr>
+              <a:t>1/3 of the global food production is wasted each year.</a:t>
+            </a:r>
+          </a:p>
+        </p:txBody>
+      </p:sp>
+      <p:sp>
+        <p:nvSpPr>
+          <p:cNvPr id="61" name="Rectangle 60">
+            <a:extLst>
+              <a:ext uri="{FF2B5EF4-FFF2-40B4-BE49-F238E27FC236}">
+                <a16:creationId xmlns:a16="http://schemas.microsoft.com/office/drawing/2014/main" id="{7363FFA6-C551-4935-A474-8B2482E55BAC}"/>
+              </a:ext>
+              <a:ext uri="{C183D7F6-B498-43B3-948B-1728B52AA6E4}">
+                <adec:decorative xmlns:adec="http://schemas.microsoft.com/office/drawing/2017/decorative" val="1"/>
+              </a:ext>
+            </a:extLst>
+          </p:cNvPr>
+          <p:cNvSpPr>
+            <a:spLocks noGrp="1" noRot="1" noChangeAspect="1" noMove="1" noResize="1" noEditPoints="1" noAdjustHandles="1" noChangeArrowheads="1" noChangeShapeType="1" noTextEdit="1"/>
+          </p:cNvSpPr>
+          <p:nvPr>
+            <p:extLst>
+              <p:ext uri="{386F3935-93C4-4BCD-93E2-E3B085C9AB24}">
+                <p16:designElem xmlns:p16="http://schemas.microsoft.com/office/powerpoint/2015/main" val="1"/>
+              </p:ext>
+            </p:extLst>
+          </p:nvPr>
+        </p:nvSpPr>
+        <p:spPr>
+          <a:xfrm>
+            <a:off x="1" y="6400800"/>
+            <a:ext cx="12192000" cy="457200"/>
+          </a:xfrm>
+          <a:prstGeom prst="rect">
+            <a:avLst/>
+          </a:prstGeom>
+          <a:solidFill>
+            <a:srgbClr val="262626">
+              <a:alpha val="95000"/>
+            </a:srgbClr>
+          </a:solidFill>
+          <a:ln>
+            <a:noFill/>
+          </a:ln>
+        </p:spPr>
+        <p:style>
+          <a:lnRef idx="2">
+            <a:schemeClr val="accent1">
+              <a:shade val="50000"/>
+            </a:schemeClr>
+          </a:lnRef>
+          <a:fillRef idx="1">
+            <a:schemeClr val="accent1"/>
+          </a:fillRef>
+          <a:effectRef idx="0">
+            <a:schemeClr val="accent1"/>
+          </a:effectRef>
+          <a:fontRef idx="minor">
+            <a:schemeClr val="lt1"/>
+          </a:fontRef>
+        </p:style>
+      </p:sp>
+    </p:spTree>
+    <p:extLst>
+      <p:ext uri="{BB962C8B-B14F-4D97-AF65-F5344CB8AC3E}">
+        <p14:creationId xmlns:p14="http://schemas.microsoft.com/office/powerpoint/2010/main" val="1369970980"/>
+      </p:ext>
+    </p:extLst>
+  </p:cSld>
+  <p:clrMapOvr>
+    <a:overrideClrMapping bg1="dk1" tx1="lt1" bg2="dk2" tx2="lt2" accent1="accent1" accent2="accent2" accent3="accent3" accent4="accent4" accent5="accent5" accent6="accent6" hlink="hlink" folHlink="folHlink"/>
   </p:clrMapOvr>
 </p:sld>
 </file>

</xml_diff>